<commit_message>
Roteiro para o predict
</commit_message>
<xml_diff>
--- a/Apresentacao Linguagem R.pptx
+++ b/Apresentacao Linguagem R.pptx
@@ -13745,7 +13745,6 @@
               <a:rPr lang="en-US" sz="1400" dirty="0" smtClean="0"/>
               <a:t>		NULL</a:t>
             </a:r>
-            <a:endParaRPr lang="en-US" sz="1400" dirty="0" smtClean="0"/>
           </a:p>
           <a:p>
             <a:r>
@@ -13810,7 +13809,75 @@
             </a:r>
             <a:r>
               <a:rPr lang="en-US" sz="1400" dirty="0" smtClean="0"/>
-              <a:t>	a </a:t>
+              <a:t>	a function</a:t>
+            </a:r>
+          </a:p>
+          <a:p>
+            <a:r>
+              <a:rPr lang="en-US" sz="1400" dirty="0" smtClean="0"/>
+              <a:t>"environment“	</a:t>
+            </a:r>
+            <a:r>
+              <a:rPr lang="en-US" sz="1400" dirty="0"/>
+              <a:t>	an </a:t>
+            </a:r>
+            <a:r>
+              <a:rPr lang="en-US" sz="1400" dirty="0" smtClean="0"/>
+              <a:t>environment</a:t>
+            </a:r>
+          </a:p>
+          <a:p>
+            <a:r>
+              <a:rPr lang="en-US" sz="1400" dirty="0" smtClean="0"/>
+              <a:t>"promise“	</a:t>
+            </a:r>
+            <a:r>
+              <a:rPr lang="en-US" sz="1400" dirty="0"/>
+              <a:t>	an object used to implement lazy </a:t>
+            </a:r>
+            <a:r>
+              <a:rPr lang="en-US" sz="1400" dirty="0" smtClean="0"/>
+              <a:t>evaluation</a:t>
+            </a:r>
+          </a:p>
+          <a:p>
+            <a:r>
+              <a:rPr lang="en-US" sz="1400" dirty="0" smtClean="0"/>
+              <a:t>"</a:t>
+            </a:r>
+            <a:r>
+              <a:rPr lang="en-US" sz="1400" dirty="0"/>
+              <a:t>language"	</a:t>
+            </a:r>
+            <a:r>
+              <a:rPr lang="en-US" sz="1400" dirty="0" smtClean="0"/>
+              <a:t>	an </a:t>
+            </a:r>
+            <a:r>
+              <a:rPr lang="en-US" sz="1400" dirty="0"/>
+              <a:t>R language </a:t>
+            </a:r>
+            <a:r>
+              <a:rPr lang="en-US" sz="1400" dirty="0" smtClean="0"/>
+              <a:t>construct</a:t>
+            </a:r>
+          </a:p>
+          <a:p>
+            <a:r>
+              <a:rPr lang="en-US" sz="1400" dirty="0" smtClean="0"/>
+              <a:t>"</a:t>
+            </a:r>
+            <a:r>
+              <a:rPr lang="en-US" sz="1400" dirty="0"/>
+              <a:t>special"	</a:t>
+            </a:r>
+            <a:r>
+              <a:rPr lang="en-US" sz="1400" dirty="0" smtClean="0"/>
+              <a:t>	an </a:t>
+            </a:r>
+            <a:r>
+              <a:rPr lang="en-US" sz="1400" dirty="0"/>
+              <a:t>internal </a:t>
             </a:r>
             <a:r>
               <a:rPr lang="en-US" sz="1400" dirty="0" smtClean="0"/>
@@ -13823,17 +13890,22 @@
               <a:t>"</a:t>
             </a:r>
             <a:r>
+              <a:rPr lang="en-US" sz="1400" dirty="0" err="1"/>
+              <a:t>builtin</a:t>
+            </a:r>
+            <a:r>
+              <a:rPr lang="en-US" sz="1400" dirty="0"/>
+              <a:t>"	</a:t>
+            </a:r>
+            <a:r>
               <a:rPr lang="en-US" sz="1400" dirty="0" smtClean="0"/>
-              <a:t>environment“	</a:t>
+              <a:t>		an </a:t>
             </a:r>
             <a:r>
               <a:rPr lang="en-US" sz="1400" dirty="0"/>
-              <a:t>	an </a:t>
-            </a:r>
-            <a:r>
-              <a:rPr lang="en-US" sz="1400" dirty="0" smtClean="0"/>
-              <a:t>environment</a:t>
-            </a:r>
+              <a:t>internal </a:t>
+            </a:r>
+            <a:endParaRPr lang="en-US" sz="1400" dirty="0" smtClean="0"/>
           </a:p>
           <a:p>
             <a:r>
@@ -13841,92 +13913,6 @@
               <a:t>"</a:t>
             </a:r>
             <a:r>
-              <a:rPr lang="en-US" sz="1400" dirty="0" smtClean="0"/>
-              <a:t>promise“	</a:t>
-            </a:r>
-            <a:r>
-              <a:rPr lang="en-US" sz="1400" dirty="0"/>
-              <a:t>	an object used to implement lazy </a:t>
-            </a:r>
-            <a:r>
-              <a:rPr lang="en-US" sz="1400" dirty="0" smtClean="0"/>
-              <a:t>evaluation</a:t>
-            </a:r>
-          </a:p>
-          <a:p>
-            <a:r>
-              <a:rPr lang="en-US" sz="1400" dirty="0" smtClean="0"/>
-              <a:t>"</a:t>
-            </a:r>
-            <a:r>
-              <a:rPr lang="en-US" sz="1400" dirty="0"/>
-              <a:t>language"	</a:t>
-            </a:r>
-            <a:r>
-              <a:rPr lang="en-US" sz="1400" dirty="0" smtClean="0"/>
-              <a:t>	an </a:t>
-            </a:r>
-            <a:r>
-              <a:rPr lang="en-US" sz="1400" dirty="0"/>
-              <a:t>R language </a:t>
-            </a:r>
-            <a:r>
-              <a:rPr lang="en-US" sz="1400" dirty="0" smtClean="0"/>
-              <a:t>construct</a:t>
-            </a:r>
-          </a:p>
-          <a:p>
-            <a:r>
-              <a:rPr lang="en-US" sz="1400" dirty="0" smtClean="0"/>
-              <a:t>"</a:t>
-            </a:r>
-            <a:r>
-              <a:rPr lang="en-US" sz="1400" dirty="0"/>
-              <a:t>special"	</a:t>
-            </a:r>
-            <a:r>
-              <a:rPr lang="en-US" sz="1400" dirty="0" smtClean="0"/>
-              <a:t>	an </a:t>
-            </a:r>
-            <a:r>
-              <a:rPr lang="en-US" sz="1400" dirty="0"/>
-              <a:t>internal </a:t>
-            </a:r>
-            <a:r>
-              <a:rPr lang="en-US" sz="1400" dirty="0" smtClean="0"/>
-              <a:t>function</a:t>
-            </a:r>
-            <a:endParaRPr lang="en-US" sz="1400" dirty="0" smtClean="0"/>
-          </a:p>
-          <a:p>
-            <a:r>
-              <a:rPr lang="en-US" sz="1400" dirty="0" smtClean="0"/>
-              <a:t>"</a:t>
-            </a:r>
-            <a:r>
-              <a:rPr lang="en-US" sz="1400" dirty="0" err="1"/>
-              <a:t>builtin</a:t>
-            </a:r>
-            <a:r>
-              <a:rPr lang="en-US" sz="1400" dirty="0"/>
-              <a:t>"	</a:t>
-            </a:r>
-            <a:r>
-              <a:rPr lang="en-US" sz="1400" dirty="0" smtClean="0"/>
-              <a:t>		an </a:t>
-            </a:r>
-            <a:r>
-              <a:rPr lang="en-US" sz="1400" dirty="0"/>
-              <a:t>internal </a:t>
-            </a:r>
-            <a:endParaRPr lang="en-US" sz="1400" dirty="0" smtClean="0"/>
-          </a:p>
-          <a:p>
-            <a:r>
-              <a:rPr lang="en-US" sz="1400" dirty="0" smtClean="0"/>
-              <a:t>"</a:t>
-            </a:r>
-            <a:r>
               <a:rPr lang="en-US" sz="1400" dirty="0"/>
               <a:t>char"	</a:t>
             </a:r>
@@ -13946,11 +13932,7 @@
           <a:p>
             <a:r>
               <a:rPr lang="en-US" sz="1400" dirty="0" smtClean="0"/>
-              <a:t>"</a:t>
-            </a:r>
-            <a:r>
-              <a:rPr lang="en-US" sz="1400" dirty="0" smtClean="0"/>
-              <a:t>logical“		</a:t>
+              <a:t>"logical“		</a:t>
             </a:r>
             <a:r>
               <a:rPr lang="en-US" sz="1400" dirty="0"/>
@@ -16435,11 +16417,7 @@
             </a:r>
             <a:r>
               <a:rPr lang="en-US" dirty="0" smtClean="0"/>
-              <a:t> </a:t>
-            </a:r>
-            <a:r>
-              <a:rPr lang="en-US" dirty="0" smtClean="0"/>
-              <a:t>o </a:t>
+              <a:t> o </a:t>
             </a:r>
             <a:r>
               <a:rPr lang="en-US" dirty="0" err="1" smtClean="0"/>
@@ -16503,11 +16481,7 @@
             </a:r>
             <a:r>
               <a:rPr lang="en-US" dirty="0" smtClean="0"/>
-              <a:t>. </a:t>
-            </a:r>
-            <a:r>
-              <a:rPr lang="en-US" dirty="0" smtClean="0"/>
-              <a:t>Um </a:t>
+              <a:t>. Um </a:t>
             </a:r>
             <a:r>
               <a:rPr lang="en-US" dirty="0" err="1" smtClean="0"/>
@@ -16565,7 +16539,6 @@
               <a:rPr lang="en-US" dirty="0" smtClean="0"/>
               <a:t>.</a:t>
             </a:r>
-            <a:endParaRPr lang="en-US" dirty="0" smtClean="0"/>
           </a:p>
           <a:p>
             <a:pPr marL="0" indent="0">

</xml_diff>